<commit_message>
uml/ad: add exercises for linear, alternate, parallel paths
</commit_message>
<xml_diff>
--- a/diagrams/uml/activityDiagrams/basicNotations/linearPaths/notation.pptx
+++ b/diagrams/uml/activityDiagrams/basicNotations/linearPaths/notation.pptx
@@ -304,7 +304,7 @@
           <a:p>
             <a:fld id="{66D91632-7911-4BFA-A741-BD874230E827}" type="datetimeFigureOut">
               <a:rPr lang="en-SG" smtClean="0"/>
-              <a:t>19/1/2018</a:t>
+              <a:t>21/1/2018</a:t>
             </a:fld>
             <a:endParaRPr lang="en-SG"/>
           </a:p>
@@ -474,7 +474,7 @@
           <a:p>
             <a:fld id="{66D91632-7911-4BFA-A741-BD874230E827}" type="datetimeFigureOut">
               <a:rPr lang="en-SG" smtClean="0"/>
-              <a:t>19/1/2018</a:t>
+              <a:t>21/1/2018</a:t>
             </a:fld>
             <a:endParaRPr lang="en-SG"/>
           </a:p>
@@ -654,7 +654,7 @@
           <a:p>
             <a:fld id="{66D91632-7911-4BFA-A741-BD874230E827}" type="datetimeFigureOut">
               <a:rPr lang="en-SG" smtClean="0"/>
-              <a:t>19/1/2018</a:t>
+              <a:t>21/1/2018</a:t>
             </a:fld>
             <a:endParaRPr lang="en-SG"/>
           </a:p>
@@ -824,7 +824,7 @@
           <a:p>
             <a:fld id="{66D91632-7911-4BFA-A741-BD874230E827}" type="datetimeFigureOut">
               <a:rPr lang="en-SG" smtClean="0"/>
-              <a:t>19/1/2018</a:t>
+              <a:t>21/1/2018</a:t>
             </a:fld>
             <a:endParaRPr lang="en-SG"/>
           </a:p>
@@ -1070,7 +1070,7 @@
           <a:p>
             <a:fld id="{66D91632-7911-4BFA-A741-BD874230E827}" type="datetimeFigureOut">
               <a:rPr lang="en-SG" smtClean="0"/>
-              <a:t>19/1/2018</a:t>
+              <a:t>21/1/2018</a:t>
             </a:fld>
             <a:endParaRPr lang="en-SG"/>
           </a:p>
@@ -1358,7 +1358,7 @@
           <a:p>
             <a:fld id="{66D91632-7911-4BFA-A741-BD874230E827}" type="datetimeFigureOut">
               <a:rPr lang="en-SG" smtClean="0"/>
-              <a:t>19/1/2018</a:t>
+              <a:t>21/1/2018</a:t>
             </a:fld>
             <a:endParaRPr lang="en-SG"/>
           </a:p>
@@ -1780,7 +1780,7 @@
           <a:p>
             <a:fld id="{66D91632-7911-4BFA-A741-BD874230E827}" type="datetimeFigureOut">
               <a:rPr lang="en-SG" smtClean="0"/>
-              <a:t>19/1/2018</a:t>
+              <a:t>21/1/2018</a:t>
             </a:fld>
             <a:endParaRPr lang="en-SG"/>
           </a:p>
@@ -1898,7 +1898,7 @@
           <a:p>
             <a:fld id="{66D91632-7911-4BFA-A741-BD874230E827}" type="datetimeFigureOut">
               <a:rPr lang="en-SG" smtClean="0"/>
-              <a:t>19/1/2018</a:t>
+              <a:t>21/1/2018</a:t>
             </a:fld>
             <a:endParaRPr lang="en-SG"/>
           </a:p>
@@ -1993,7 +1993,7 @@
           <a:p>
             <a:fld id="{66D91632-7911-4BFA-A741-BD874230E827}" type="datetimeFigureOut">
               <a:rPr lang="en-SG" smtClean="0"/>
-              <a:t>19/1/2018</a:t>
+              <a:t>21/1/2018</a:t>
             </a:fld>
             <a:endParaRPr lang="en-SG"/>
           </a:p>
@@ -2270,7 +2270,7 @@
           <a:p>
             <a:fld id="{66D91632-7911-4BFA-A741-BD874230E827}" type="datetimeFigureOut">
               <a:rPr lang="en-SG" smtClean="0"/>
-              <a:t>19/1/2018</a:t>
+              <a:t>21/1/2018</a:t>
             </a:fld>
             <a:endParaRPr lang="en-SG"/>
           </a:p>
@@ -2523,7 +2523,7 @@
           <a:p>
             <a:fld id="{66D91632-7911-4BFA-A741-BD874230E827}" type="datetimeFigureOut">
               <a:rPr lang="en-SG" smtClean="0"/>
-              <a:t>19/1/2018</a:t>
+              <a:t>21/1/2018</a:t>
             </a:fld>
             <a:endParaRPr lang="en-SG"/>
           </a:p>
@@ -2736,7 +2736,7 @@
           <a:p>
             <a:fld id="{66D91632-7911-4BFA-A741-BD874230E827}" type="datetimeFigureOut">
               <a:rPr lang="en-SG" smtClean="0"/>
-              <a:t>19/1/2018</a:t>
+              <a:t>21/1/2018</a:t>
             </a:fld>
             <a:endParaRPr lang="en-SG"/>
           </a:p>
@@ -3380,8 +3380,8 @@
         </p:nvGrpSpPr>
         <p:grpSpPr>
           <a:xfrm>
-            <a:off x="7130526" y="4651830"/>
-            <a:ext cx="152400" cy="152400"/>
+            <a:off x="7105304" y="4662848"/>
+            <a:ext cx="202844" cy="223128"/>
             <a:chOff x="5638800" y="4800600"/>
             <a:chExt cx="152400" cy="152400"/>
           </a:xfrm>
@@ -3534,7 +3534,7 @@
           <a:p>
             <a:pPr algn="ctr"/>
             <a:r>
-              <a:rPr lang="en-US" dirty="0" smtClean="0">
+              <a:rPr lang="en-US" b="1" dirty="0" smtClean="0">
                 <a:solidFill>
                   <a:schemeClr val="tx1"/>
                 </a:solidFill>
@@ -3599,7 +3599,7 @@
           <a:p>
             <a:pPr algn="ctr"/>
             <a:r>
-              <a:rPr lang="en-US" dirty="0" smtClean="0">
+              <a:rPr lang="en-US" b="1" dirty="0" smtClean="0">
                 <a:solidFill>
                   <a:schemeClr val="tx1"/>
                 </a:solidFill>
@@ -3664,18 +3664,13 @@
           <a:p>
             <a:pPr algn="ctr"/>
             <a:r>
-              <a:rPr lang="en-US" dirty="0" smtClean="0">
+              <a:rPr lang="en-US" b="1" dirty="0" smtClean="0">
                 <a:solidFill>
                   <a:schemeClr val="tx1"/>
                 </a:solidFill>
               </a:rPr>
               <a:t>flow/edge</a:t>
             </a:r>
-            <a:endParaRPr lang="en-US" dirty="0" smtClean="0">
-              <a:solidFill>
-                <a:schemeClr val="tx1"/>
-              </a:solidFill>
-            </a:endParaRPr>
           </a:p>
         </p:txBody>
       </p:sp>
@@ -3734,7 +3729,7 @@
           <a:p>
             <a:pPr algn="ctr"/>
             <a:r>
-              <a:rPr lang="en-US" dirty="0" smtClean="0">
+              <a:rPr lang="en-US" b="1" dirty="0" smtClean="0">
                 <a:solidFill>
                   <a:schemeClr val="tx1"/>
                 </a:solidFill>

</xml_diff>